<commit_message>
Presentation of Beer review analysis
</commit_message>
<xml_diff>
--- a/Summarization of beer reviews data analysis.pptx
+++ b/Summarization of beer reviews data analysis.pptx
@@ -9,11 +9,12 @@
     <p:sldId id="257" r:id="rId3"/>
     <p:sldId id="258" r:id="rId4"/>
     <p:sldId id="259" r:id="rId5"/>
-    <p:sldId id="260" r:id="rId6"/>
-    <p:sldId id="261" r:id="rId7"/>
-    <p:sldId id="262" r:id="rId8"/>
-    <p:sldId id="264" r:id="rId9"/>
-    <p:sldId id="265" r:id="rId10"/>
+    <p:sldId id="266" r:id="rId6"/>
+    <p:sldId id="267" r:id="rId7"/>
+    <p:sldId id="268" r:id="rId8"/>
+    <p:sldId id="269" r:id="rId9"/>
+    <p:sldId id="270" r:id="rId10"/>
+    <p:sldId id="271" r:id="rId11"/>
   </p:sldIdLst>
   <p:sldSz cx="12192000" cy="6858000"/>
   <p:notesSz cx="6858000" cy="9144000"/>
@@ -269,7 +270,7 @@
           <a:p>
             <a:fld id="{FB1FD920-8DF9-4E25-A910-198B8BD09B0B}" type="datetimeFigureOut">
               <a:rPr lang="en-IN" smtClean="0"/>
-              <a:t>11-10-2020</a:t>
+              <a:t>12-10-2020</a:t>
             </a:fld>
             <a:endParaRPr lang="en-IN"/>
           </a:p>
@@ -469,7 +470,7 @@
           <a:p>
             <a:fld id="{FB1FD920-8DF9-4E25-A910-198B8BD09B0B}" type="datetimeFigureOut">
               <a:rPr lang="en-IN" smtClean="0"/>
-              <a:t>11-10-2020</a:t>
+              <a:t>12-10-2020</a:t>
             </a:fld>
             <a:endParaRPr lang="en-IN"/>
           </a:p>
@@ -679,7 +680,7 @@
           <a:p>
             <a:fld id="{FB1FD920-8DF9-4E25-A910-198B8BD09B0B}" type="datetimeFigureOut">
               <a:rPr lang="en-IN" smtClean="0"/>
-              <a:t>11-10-2020</a:t>
+              <a:t>12-10-2020</a:t>
             </a:fld>
             <a:endParaRPr lang="en-IN"/>
           </a:p>
@@ -879,7 +880,7 @@
           <a:p>
             <a:fld id="{FB1FD920-8DF9-4E25-A910-198B8BD09B0B}" type="datetimeFigureOut">
               <a:rPr lang="en-IN" smtClean="0"/>
-              <a:t>11-10-2020</a:t>
+              <a:t>12-10-2020</a:t>
             </a:fld>
             <a:endParaRPr lang="en-IN"/>
           </a:p>
@@ -1155,7 +1156,7 @@
           <a:p>
             <a:fld id="{FB1FD920-8DF9-4E25-A910-198B8BD09B0B}" type="datetimeFigureOut">
               <a:rPr lang="en-IN" smtClean="0"/>
-              <a:t>11-10-2020</a:t>
+              <a:t>12-10-2020</a:t>
             </a:fld>
             <a:endParaRPr lang="en-IN"/>
           </a:p>
@@ -1423,7 +1424,7 @@
           <a:p>
             <a:fld id="{FB1FD920-8DF9-4E25-A910-198B8BD09B0B}" type="datetimeFigureOut">
               <a:rPr lang="en-IN" smtClean="0"/>
-              <a:t>11-10-2020</a:t>
+              <a:t>12-10-2020</a:t>
             </a:fld>
             <a:endParaRPr lang="en-IN"/>
           </a:p>
@@ -1838,7 +1839,7 @@
           <a:p>
             <a:fld id="{FB1FD920-8DF9-4E25-A910-198B8BD09B0B}" type="datetimeFigureOut">
               <a:rPr lang="en-IN" smtClean="0"/>
-              <a:t>11-10-2020</a:t>
+              <a:t>12-10-2020</a:t>
             </a:fld>
             <a:endParaRPr lang="en-IN"/>
           </a:p>
@@ -1980,7 +1981,7 @@
           <a:p>
             <a:fld id="{FB1FD920-8DF9-4E25-A910-198B8BD09B0B}" type="datetimeFigureOut">
               <a:rPr lang="en-IN" smtClean="0"/>
-              <a:t>11-10-2020</a:t>
+              <a:t>12-10-2020</a:t>
             </a:fld>
             <a:endParaRPr lang="en-IN"/>
           </a:p>
@@ -2093,7 +2094,7 @@
           <a:p>
             <a:fld id="{FB1FD920-8DF9-4E25-A910-198B8BD09B0B}" type="datetimeFigureOut">
               <a:rPr lang="en-IN" smtClean="0"/>
-              <a:t>11-10-2020</a:t>
+              <a:t>12-10-2020</a:t>
             </a:fld>
             <a:endParaRPr lang="en-IN"/>
           </a:p>
@@ -2406,7 +2407,7 @@
           <a:p>
             <a:fld id="{FB1FD920-8DF9-4E25-A910-198B8BD09B0B}" type="datetimeFigureOut">
               <a:rPr lang="en-IN" smtClean="0"/>
-              <a:t>11-10-2020</a:t>
+              <a:t>12-10-2020</a:t>
             </a:fld>
             <a:endParaRPr lang="en-IN"/>
           </a:p>
@@ -2695,7 +2696,7 @@
           <a:p>
             <a:fld id="{FB1FD920-8DF9-4E25-A910-198B8BD09B0B}" type="datetimeFigureOut">
               <a:rPr lang="en-IN" smtClean="0"/>
-              <a:t>11-10-2020</a:t>
+              <a:t>12-10-2020</a:t>
             </a:fld>
             <a:endParaRPr lang="en-IN"/>
           </a:p>
@@ -2938,7 +2939,7 @@
           <a:p>
             <a:fld id="{FB1FD920-8DF9-4E25-A910-198B8BD09B0B}" type="datetimeFigureOut">
               <a:rPr lang="en-IN" smtClean="0"/>
-              <a:t>11-10-2020</a:t>
+              <a:t>12-10-2020</a:t>
             </a:fld>
             <a:endParaRPr lang="en-IN"/>
           </a:p>
@@ -3494,8 +3495,8 @@
               <a:buChar char="Ø"/>
             </a:pPr>
             <a:r>
-              <a:rPr lang="en-IN" sz="2000" dirty="0"/>
-              <a:t>Questions:-</a:t>
+              <a:rPr lang="en-IN" sz="2000" b="1" dirty="0"/>
+              <a:t>Questions:</a:t>
             </a:r>
           </a:p>
           <a:p>
@@ -3895,6 +3896,183 @@
 </p:sld>
 </file>
 
+<file path=ppt/slides/slide10.xml><?xml version="1.0" encoding="utf-8"?>
+<p:sld xmlns:a="http://schemas.openxmlformats.org/drawingml/2006/main" xmlns:r="http://schemas.openxmlformats.org/officeDocument/2006/relationships" xmlns:p="http://schemas.openxmlformats.org/presentationml/2006/main">
+  <p:cSld>
+    <p:spTree>
+      <p:nvGrpSpPr>
+        <p:cNvPr id="1" name=""/>
+        <p:cNvGrpSpPr/>
+        <p:nvPr/>
+      </p:nvGrpSpPr>
+      <p:grpSpPr>
+        <a:xfrm>
+          <a:off x="0" y="0"/>
+          <a:ext cx="0" cy="0"/>
+          <a:chOff x="0" y="0"/>
+          <a:chExt cx="0" cy="0"/>
+        </a:xfrm>
+      </p:grpSpPr>
+      <p:sp>
+        <p:nvSpPr>
+          <p:cNvPr id="2" name="Title 1">
+            <a:extLst>
+              <a:ext uri="{FF2B5EF4-FFF2-40B4-BE49-F238E27FC236}">
+                <a16:creationId xmlns:a16="http://schemas.microsoft.com/office/drawing/2014/main" id="{C9E6F332-56DF-42E4-B1BC-0B0970E54B98}"/>
+              </a:ext>
+            </a:extLst>
+          </p:cNvPr>
+          <p:cNvSpPr>
+            <a:spLocks noGrp="1"/>
+          </p:cNvSpPr>
+          <p:nvPr>
+            <p:ph type="title"/>
+          </p:nvPr>
+        </p:nvSpPr>
+        <p:spPr/>
+        <p:txBody>
+          <a:bodyPr/>
+          <a:lstStyle/>
+          <a:p>
+            <a:r>
+              <a:rPr lang="en-IN" sz="3600" dirty="0"/>
+              <a:t>Business</a:t>
+            </a:r>
+            <a:r>
+              <a:rPr lang="en-IN" dirty="0"/>
+              <a:t> </a:t>
+            </a:r>
+            <a:r>
+              <a:rPr lang="en-IN" sz="3600" dirty="0"/>
+              <a:t>problems continued…</a:t>
+            </a:r>
+          </a:p>
+        </p:txBody>
+      </p:sp>
+      <p:sp>
+        <p:nvSpPr>
+          <p:cNvPr id="3" name="Content Placeholder 2">
+            <a:extLst>
+              <a:ext uri="{FF2B5EF4-FFF2-40B4-BE49-F238E27FC236}">
+                <a16:creationId xmlns:a16="http://schemas.microsoft.com/office/drawing/2014/main" id="{91EDB5C8-BA0E-4029-947E-21352312AC94}"/>
+              </a:ext>
+            </a:extLst>
+          </p:cNvPr>
+          <p:cNvSpPr>
+            <a:spLocks noGrp="1"/>
+          </p:cNvSpPr>
+          <p:nvPr>
+            <p:ph idx="1"/>
+          </p:nvPr>
+        </p:nvSpPr>
+        <p:spPr/>
+        <p:txBody>
+          <a:bodyPr>
+            <a:normAutofit/>
+          </a:bodyPr>
+          <a:lstStyle/>
+          <a:p>
+            <a:pPr marL="0" indent="0">
+              <a:buNone/>
+            </a:pPr>
+            <a:r>
+              <a:rPr lang="en-US" sz="2000" i="0" dirty="0">
+                <a:solidFill>
+                  <a:srgbClr val="000000"/>
+                </a:solidFill>
+                <a:effectLst/>
+              </a:rPr>
+              <a:t>6. How does written review compare to overall review score for the beer styles? </a:t>
+            </a:r>
+          </a:p>
+          <a:p>
+            <a:pPr marL="0" indent="0">
+              <a:buNone/>
+            </a:pPr>
+            <a:r>
+              <a:rPr lang="en-US" sz="2000" dirty="0"/>
+              <a:t>Ans.</a:t>
+            </a:r>
+            <a:r>
+              <a:rPr lang="en-US" sz="2000" dirty="0">
+                <a:solidFill>
+                  <a:srgbClr val="333333"/>
+                </a:solidFill>
+              </a:rPr>
+              <a:t> </a:t>
+            </a:r>
+          </a:p>
+          <a:p>
+            <a:pPr marL="0" indent="0">
+              <a:buNone/>
+            </a:pPr>
+            <a:r>
+              <a:rPr lang="en-US" sz="2000" dirty="0">
+                <a:solidFill>
+                  <a:srgbClr val="000000"/>
+                </a:solidFill>
+              </a:rPr>
+              <a:t>Logic:</a:t>
+            </a:r>
+          </a:p>
+          <a:p>
+            <a:r>
+              <a:rPr lang="en-US" sz="1800" i="0" dirty="0">
+                <a:solidFill>
+                  <a:srgbClr val="000000"/>
+                </a:solidFill>
+                <a:effectLst/>
+              </a:rPr>
+              <a:t>Here we are reviewed</a:t>
+            </a:r>
+            <a:r>
+              <a:rPr lang="en-US" sz="1800" dirty="0">
+                <a:solidFill>
+                  <a:srgbClr val="000000"/>
+                </a:solidFill>
+              </a:rPr>
+              <a:t> the compare overall review feature with written review for beer style</a:t>
+            </a:r>
+          </a:p>
+          <a:p>
+            <a:r>
+              <a:rPr lang="en-US" sz="1800" i="0" dirty="0">
+                <a:solidFill>
+                  <a:srgbClr val="000000"/>
+                </a:solidFill>
+                <a:effectLst/>
+              </a:rPr>
+              <a:t>we visualized the features of overall review and written review after visualizing we found out that overall review column mostly like text review column</a:t>
+            </a:r>
+          </a:p>
+          <a:p>
+            <a:r>
+              <a:rPr lang="en-US" sz="1800" dirty="0"/>
+              <a:t>Positive review indicates high overall score where negative review show low score and neutral show mixed reviews(positive or negative)</a:t>
+            </a:r>
+          </a:p>
+          <a:p>
+            <a:r>
+              <a:rPr lang="en-US" sz="1800" dirty="0"/>
+              <a:t> We conclude both overall review and text-based review are quiet similar reviews for beer styles</a:t>
+            </a:r>
+            <a:endParaRPr lang="en-IN" sz="1800" dirty="0"/>
+          </a:p>
+        </p:txBody>
+      </p:sp>
+    </p:spTree>
+    <p:extLst>
+      <p:ext uri="{BB962C8B-B14F-4D97-AF65-F5344CB8AC3E}">
+        <p14:creationId xmlns:p14="http://schemas.microsoft.com/office/powerpoint/2010/main" val="3044454115"/>
+      </p:ext>
+    </p:extLst>
+  </p:cSld>
+  <p:clrMapOvr>
+    <a:masterClrMapping/>
+  </p:clrMapOvr>
+</p:sld>
+</file>
+
 <file path=ppt/slides/slide2.xml><?xml version="1.0" encoding="utf-8"?>
 <p:sld xmlns:a="http://schemas.openxmlformats.org/drawingml/2006/main" xmlns:r="http://schemas.openxmlformats.org/officeDocument/2006/relationships" xmlns:p="http://schemas.openxmlformats.org/presentationml/2006/main">
   <p:cSld>
@@ -4022,15 +4200,7 @@
             </a:r>
             <a:r>
               <a:rPr lang="en-US" sz="1800" dirty="0"/>
-              <a:t> - </a:t>
-            </a:r>
-            <a:r>
-              <a:rPr lang="en-US" sz="1800" dirty="0" err="1"/>
-              <a:t>unqiue</a:t>
-            </a:r>
-            <a:r>
-              <a:rPr lang="en-US" sz="1800" dirty="0"/>
-              <a:t> identifier for the brewer</a:t>
+              <a:t> - unique identifier for the brewer</a:t>
             </a:r>
           </a:p>
           <a:p>
@@ -4064,7 +4234,7 @@
             </a:r>
             <a:r>
               <a:rPr lang="en-US" sz="1800" dirty="0"/>
-              <a:t> - categories of beers</a:t>
+              <a:t> - categories of beer</a:t>
             </a:r>
           </a:p>
           <a:p>
@@ -4081,15 +4251,7 @@
             </a:r>
             <a:r>
               <a:rPr lang="en-US" sz="1800" dirty="0"/>
-              <a:t> - </a:t>
-            </a:r>
-            <a:r>
-              <a:rPr lang="en-US" sz="1800" dirty="0" err="1"/>
-              <a:t>appereance</a:t>
-            </a:r>
-            <a:r>
-              <a:rPr lang="en-US" sz="1800" dirty="0"/>
-              <a:t> of the review rating between 1 to 5</a:t>
+              <a:t> - appearance of the review rating between 1 to 5</a:t>
             </a:r>
           </a:p>
           <a:p>
@@ -4106,15 +4268,7 @@
             </a:r>
             <a:r>
               <a:rPr lang="en-US" sz="1800" dirty="0"/>
-              <a:t> - palette of the review rating </a:t>
-            </a:r>
-            <a:r>
-              <a:rPr lang="en-US" sz="1800" dirty="0" err="1"/>
-              <a:t>rating</a:t>
-            </a:r>
-            <a:r>
-              <a:rPr lang="en-US" sz="1800" dirty="0"/>
-              <a:t> between 1 and 5</a:t>
+              <a:t> - palette of the review rating between 1 to 5</a:t>
             </a:r>
           </a:p>
           <a:p>
@@ -4182,7 +4336,7 @@
             </a:r>
             <a:r>
               <a:rPr lang="en-US" sz="1800" dirty="0"/>
-              <a:t> - scent of beer for the review rating between 1 to 5</a:t>
+              <a:t> - scent of the beer for the review rating between 1 to 5</a:t>
             </a:r>
           </a:p>
           <a:p>
@@ -4310,13 +4464,13 @@
         </p:nvSpPr>
         <p:spPr>
           <a:xfrm>
-            <a:off x="838200" y="1624614"/>
-            <a:ext cx="10515600" cy="4225769"/>
+            <a:off x="838200" y="1624613"/>
+            <a:ext cx="10515600" cy="5015883"/>
           </a:xfrm>
         </p:spPr>
         <p:txBody>
           <a:bodyPr>
-            <a:normAutofit fontScale="85000" lnSpcReduction="20000"/>
+            <a:normAutofit fontScale="77500" lnSpcReduction="20000"/>
           </a:bodyPr>
           <a:lstStyle/>
           <a:p>
@@ -4328,22 +4482,31 @@
               <a:buChar char="Ø"/>
             </a:pPr>
             <a:r>
+              <a:rPr lang="en-US" sz="2400" b="1" dirty="0">
+                <a:effectLst/>
+                <a:latin typeface="Calibri" panose="020F0502020204030204" pitchFamily="34" charset="0"/>
+                <a:ea typeface="Times New Roman" panose="02020603050405020304" pitchFamily="18" charset="0"/>
+                <a:cs typeface="Times New Roman" panose="02020603050405020304" pitchFamily="18" charset="0"/>
+              </a:rPr>
+              <a:t>Objective</a:t>
+            </a:r>
+            <a:r>
               <a:rPr lang="en-US" sz="2000" dirty="0">
                 <a:effectLst/>
                 <a:latin typeface="Calibri" panose="020F0502020204030204" pitchFamily="34" charset="0"/>
                 <a:ea typeface="Times New Roman" panose="02020603050405020304" pitchFamily="18" charset="0"/>
                 <a:cs typeface="Times New Roman" panose="02020603050405020304" pitchFamily="18" charset="0"/>
               </a:rPr>
-              <a:t>Objective - </a:t>
-            </a:r>
-            <a:r>
-              <a:rPr lang="en-US" sz="1900" dirty="0">
+              <a:t> - </a:t>
+            </a:r>
+            <a:r>
+              <a:rPr lang="en-US" sz="2300" dirty="0">
                 <a:effectLst/>
                 <a:latin typeface="Calibri" panose="020F0502020204030204" pitchFamily="34" charset="0"/>
                 <a:ea typeface="Times New Roman" panose="02020603050405020304" pitchFamily="18" charset="0"/>
                 <a:cs typeface="Times New Roman" panose="02020603050405020304" pitchFamily="18" charset="0"/>
               </a:rPr>
-              <a:t>To Explore the dataset of beer and look for hidden answer from the data and analyze trend/pattern in data and find the solution of given problem.</a:t>
+              <a:t>To Explore the dataset of beer and look for hidden answer from the data and analyze trend/pattern in data and find the solution of given problem</a:t>
             </a:r>
           </a:p>
           <a:p>
@@ -4363,79 +4526,95 @@
               <a:buChar char="Ø"/>
             </a:pPr>
             <a:r>
-              <a:rPr lang="en-US" sz="2000" dirty="0">
+              <a:rPr lang="en-US" sz="2400" b="1" dirty="0">
                 <a:effectLst/>
                 <a:latin typeface="Calibri" panose="020F0502020204030204" pitchFamily="34" charset="0"/>
                 <a:ea typeface="Times New Roman" panose="02020603050405020304" pitchFamily="18" charset="0"/>
                 <a:cs typeface="Times New Roman" panose="02020603050405020304" pitchFamily="18" charset="0"/>
               </a:rPr>
-              <a:t>Cleaning data:-</a:t>
-            </a:r>
-          </a:p>
-          <a:p>
-            <a:pPr marL="914400" lvl="1" indent="-457200">
-              <a:buFont typeface="+mj-lt"/>
-              <a:buAutoNum type="arabicPeriod"/>
-            </a:pPr>
-            <a:r>
-              <a:rPr lang="en-US" sz="1800" dirty="0">
+              <a:t>Cleaning data </a:t>
+            </a:r>
+            <a:r>
+              <a:rPr lang="en-US" sz="2400" dirty="0">
+                <a:effectLst/>
                 <a:latin typeface="Calibri" panose="020F0502020204030204" pitchFamily="34" charset="0"/>
                 <a:ea typeface="Times New Roman" panose="02020603050405020304" pitchFamily="18" charset="0"/>
                 <a:cs typeface="Times New Roman" panose="02020603050405020304" pitchFamily="18" charset="0"/>
               </a:rPr>
-              <a:t>Check for missing data and how to deal with it?</a:t>
-            </a:r>
-          </a:p>
-          <a:p>
-            <a:pPr marL="914400" lvl="1" indent="-457200">
-              <a:buFont typeface="+mj-lt"/>
-              <a:buAutoNum type="arabicPeriod"/>
-            </a:pPr>
-            <a:r>
-              <a:rPr lang="en-US" sz="1800" dirty="0">
+              <a:t>-</a:t>
+            </a:r>
+          </a:p>
+          <a:p>
+            <a:pPr lvl="1"/>
+            <a:r>
+              <a:rPr lang="en-US" sz="2300" dirty="0">
                 <a:latin typeface="Calibri" panose="020F0502020204030204" pitchFamily="34" charset="0"/>
                 <a:ea typeface="Times New Roman" panose="02020603050405020304" pitchFamily="18" charset="0"/>
                 <a:cs typeface="Times New Roman" panose="02020603050405020304" pitchFamily="18" charset="0"/>
               </a:rPr>
-              <a:t>Applied basics statistics such as mean of ratings, unique </a:t>
-            </a:r>
-            <a:r>
-              <a:rPr lang="en-US" sz="1800" dirty="0" err="1">
+              <a:t>Check for missing data and how to deal with it</a:t>
+            </a:r>
+          </a:p>
+          <a:p>
+            <a:pPr lvl="1"/>
+            <a:r>
+              <a:rPr lang="en-US" sz="2300" dirty="0">
                 <a:latin typeface="Calibri" panose="020F0502020204030204" pitchFamily="34" charset="0"/>
                 <a:ea typeface="Times New Roman" panose="02020603050405020304" pitchFamily="18" charset="0"/>
                 <a:cs typeface="Times New Roman" panose="02020603050405020304" pitchFamily="18" charset="0"/>
               </a:rPr>
-              <a:t>categories,max</a:t>
-            </a:r>
-            <a:r>
-              <a:rPr lang="en-US" sz="1800" dirty="0">
+              <a:t>Applied basics statistics such as mean of ratings, unique </a:t>
+            </a:r>
+            <a:r>
+              <a:rPr lang="en-US" sz="2300" dirty="0" err="1">
                 <a:latin typeface="Calibri" panose="020F0502020204030204" pitchFamily="34" charset="0"/>
                 <a:ea typeface="Times New Roman" panose="02020603050405020304" pitchFamily="18" charset="0"/>
                 <a:cs typeface="Times New Roman" panose="02020603050405020304" pitchFamily="18" charset="0"/>
               </a:rPr>
-              <a:t> </a:t>
-            </a:r>
-            <a:r>
-              <a:rPr lang="en-US" sz="1800" dirty="0" err="1">
+              <a:t>categories,max</a:t>
+            </a:r>
+            <a:r>
+              <a:rPr lang="en-US" sz="2300" dirty="0">
                 <a:latin typeface="Calibri" panose="020F0502020204030204" pitchFamily="34" charset="0"/>
                 <a:ea typeface="Times New Roman" panose="02020603050405020304" pitchFamily="18" charset="0"/>
                 <a:cs typeface="Times New Roman" panose="02020603050405020304" pitchFamily="18" charset="0"/>
               </a:rPr>
+              <a:t> </a:t>
+            </a:r>
+            <a:r>
+              <a:rPr lang="en-US" sz="2300" dirty="0" err="1">
+                <a:latin typeface="Calibri" panose="020F0502020204030204" pitchFamily="34" charset="0"/>
+                <a:ea typeface="Times New Roman" panose="02020603050405020304" pitchFamily="18" charset="0"/>
+                <a:cs typeface="Times New Roman" panose="02020603050405020304" pitchFamily="18" charset="0"/>
+              </a:rPr>
               <a:t>value,std</a:t>
             </a:r>
-            <a:endParaRPr lang="en-US" sz="1800" dirty="0">
+            <a:r>
+              <a:rPr lang="en-US" sz="2300" dirty="0">
+                <a:latin typeface="Calibri" panose="020F0502020204030204" pitchFamily="34" charset="0"/>
+                <a:ea typeface="Times New Roman" panose="02020603050405020304" pitchFamily="18" charset="0"/>
+                <a:cs typeface="Times New Roman" panose="02020603050405020304" pitchFamily="18" charset="0"/>
+              </a:rPr>
+              <a:t> </a:t>
+            </a:r>
+            <a:r>
+              <a:rPr lang="en-US" sz="2300" dirty="0" err="1">
+                <a:latin typeface="Calibri" panose="020F0502020204030204" pitchFamily="34" charset="0"/>
+                <a:ea typeface="Times New Roman" panose="02020603050405020304" pitchFamily="18" charset="0"/>
+                <a:cs typeface="Times New Roman" panose="02020603050405020304" pitchFamily="18" charset="0"/>
+              </a:rPr>
+              <a:t>etc</a:t>
+            </a:r>
+            <a:endParaRPr lang="en-US" sz="2300" dirty="0">
               <a:latin typeface="Calibri" panose="020F0502020204030204" pitchFamily="34" charset="0"/>
               <a:ea typeface="Times New Roman" panose="02020603050405020304" pitchFamily="18" charset="0"/>
               <a:cs typeface="Times New Roman" panose="02020603050405020304" pitchFamily="18" charset="0"/>
             </a:endParaRPr>
           </a:p>
           <a:p>
-            <a:pPr marL="914400" lvl="1" indent="-457200">
-              <a:buFont typeface="+mj-lt"/>
-              <a:buAutoNum type="arabicPeriod"/>
-            </a:pPr>
-            <a:r>
-              <a:rPr lang="en-US" sz="1800" dirty="0">
+            <a:pPr lvl="1"/>
+            <a:r>
+              <a:rPr lang="en-US" sz="2300" dirty="0">
                 <a:effectLst/>
                 <a:latin typeface="Calibri" panose="020F0502020204030204" pitchFamily="34" charset="0"/>
                 <a:ea typeface="Times New Roman" panose="02020603050405020304" pitchFamily="18" charset="0"/>
@@ -4444,7 +4623,7 @@
               <a:t>Change the datatype of feature such as </a:t>
             </a:r>
             <a:r>
-              <a:rPr lang="en-US" sz="1800" dirty="0" err="1">
+              <a:rPr lang="en-US" sz="2300" dirty="0" err="1">
                 <a:effectLst/>
                 <a:latin typeface="Calibri" panose="020F0502020204030204" pitchFamily="34" charset="0"/>
                 <a:ea typeface="Times New Roman" panose="02020603050405020304" pitchFamily="18" charset="0"/>
@@ -4453,74 +4632,49 @@
               <a:t>review_time</a:t>
             </a:r>
             <a:r>
-              <a:rPr lang="en-US" sz="1800" dirty="0">
+              <a:rPr lang="en-US" sz="2300" dirty="0">
                 <a:effectLst/>
                 <a:latin typeface="Calibri" panose="020F0502020204030204" pitchFamily="34" charset="0"/>
                 <a:ea typeface="Times New Roman" panose="02020603050405020304" pitchFamily="18" charset="0"/>
                 <a:cs typeface="Times New Roman" panose="02020603050405020304" pitchFamily="18" charset="0"/>
               </a:rPr>
-              <a:t> is integer type to convert into datetime object.</a:t>
-            </a:r>
-          </a:p>
-          <a:p>
-            <a:pPr marL="914400" lvl="1" indent="-457200">
-              <a:buFont typeface="+mj-lt"/>
-              <a:buAutoNum type="arabicPeriod"/>
-            </a:pPr>
-            <a:r>
-              <a:rPr lang="en-IN" sz="1800" dirty="0">
+              <a:t> is integer type to convert into datetime object</a:t>
+            </a:r>
+          </a:p>
+          <a:p>
+            <a:pPr lvl="1"/>
+            <a:r>
+              <a:rPr lang="en-IN" sz="2300" dirty="0">
                 <a:latin typeface="Calibri" panose="020F0502020204030204" pitchFamily="34" charset="0"/>
                 <a:ea typeface="Calibri" panose="020F0502020204030204" pitchFamily="34" charset="0"/>
                 <a:cs typeface="Times New Roman" panose="02020603050405020304" pitchFamily="18" charset="0"/>
               </a:rPr>
-              <a:t>Pre-processing the text data such as removing special </a:t>
-            </a:r>
-            <a:r>
-              <a:rPr lang="en-IN" sz="1800" dirty="0" err="1">
-                <a:latin typeface="Calibri" panose="020F0502020204030204" pitchFamily="34" charset="0"/>
-                <a:ea typeface="Calibri" panose="020F0502020204030204" pitchFamily="34" charset="0"/>
-                <a:cs typeface="Times New Roman" panose="02020603050405020304" pitchFamily="18" charset="0"/>
-              </a:rPr>
-              <a:t>characters,punctuations</a:t>
-            </a:r>
-            <a:r>
-              <a:rPr lang="en-IN" sz="1800" dirty="0">
-                <a:latin typeface="Calibri" panose="020F0502020204030204" pitchFamily="34" charset="0"/>
-                <a:ea typeface="Calibri" panose="020F0502020204030204" pitchFamily="34" charset="0"/>
-                <a:cs typeface="Times New Roman" panose="02020603050405020304" pitchFamily="18" charset="0"/>
-              </a:rPr>
-              <a:t>  as it required to find positive or negative reviews in later stage.</a:t>
-            </a:r>
-          </a:p>
-          <a:p>
-            <a:pPr marL="914400" lvl="1" indent="-457200">
-              <a:buFont typeface="+mj-lt"/>
-              <a:buAutoNum type="arabicPeriod"/>
-            </a:pPr>
-            <a:r>
-              <a:rPr lang="en-IN" sz="1800" dirty="0">
+              <a:t>Pre-processing the text data such as removing special characters, punctuations  as it required to find positive or negative reviews in later stage</a:t>
+            </a:r>
+          </a:p>
+          <a:p>
+            <a:pPr lvl="1"/>
+            <a:r>
+              <a:rPr lang="en-IN" sz="2300" dirty="0">
                 <a:effectLst/>
                 <a:latin typeface="Calibri" panose="020F0502020204030204" pitchFamily="34" charset="0"/>
                 <a:ea typeface="Calibri" panose="020F0502020204030204" pitchFamily="34" charset="0"/>
                 <a:cs typeface="Times New Roman" panose="02020603050405020304" pitchFamily="18" charset="0"/>
               </a:rPr>
-              <a:t>Checking for duplication values and removing duplicate values.</a:t>
-            </a:r>
-          </a:p>
-          <a:p>
-            <a:pPr marL="914400" lvl="1" indent="-457200">
-              <a:buFont typeface="+mj-lt"/>
-              <a:buAutoNum type="arabicPeriod"/>
-            </a:pPr>
-            <a:r>
-              <a:rPr lang="en-IN" sz="1800" dirty="0">
+              <a:t>Checked for duplicate values and removing duplicate values</a:t>
+            </a:r>
+          </a:p>
+          <a:p>
+            <a:pPr lvl="1"/>
+            <a:r>
+              <a:rPr lang="en-IN" sz="2300" dirty="0">
                 <a:latin typeface="Calibri" panose="020F0502020204030204" pitchFamily="34" charset="0"/>
                 <a:ea typeface="Calibri" panose="020F0502020204030204" pitchFamily="34" charset="0"/>
                 <a:cs typeface="Times New Roman" panose="02020603050405020304" pitchFamily="18" charset="0"/>
               </a:rPr>
-              <a:t>Remove unwanted value which not related to our analysis such as ABV which contains negative values</a:t>
-            </a:r>
-            <a:endParaRPr lang="en-IN" sz="1800" dirty="0">
+              <a:t>Remove unwanted value which were not related to our analysis such as ABV which contains negative values</a:t>
+            </a:r>
+            <a:endParaRPr lang="en-IN" sz="2300" dirty="0">
               <a:effectLst/>
               <a:latin typeface="Calibri" panose="020F0502020204030204" pitchFamily="34" charset="0"/>
               <a:ea typeface="Calibri" panose="020F0502020204030204" pitchFamily="34" charset="0"/>
@@ -4544,21 +4698,18 @@
               <a:buChar char="Ø"/>
             </a:pPr>
             <a:r>
-              <a:rPr lang="en-US" sz="2000" dirty="0">
+              <a:rPr lang="en-US" sz="2400" b="1" dirty="0">
                 <a:latin typeface="Calibri" panose="020F0502020204030204" pitchFamily="34" charset="0"/>
                 <a:ea typeface="Calibri" panose="020F0502020204030204" pitchFamily="34" charset="0"/>
                 <a:cs typeface="Times New Roman" panose="02020603050405020304" pitchFamily="18" charset="0"/>
               </a:rPr>
-              <a:t>Analyses of beer reviews data </a:t>
-            </a:r>
-          </a:p>
-          <a:p>
-            <a:pPr lvl="1">
-              <a:buFont typeface="Wingdings" panose="05000000000000000000" pitchFamily="2" charset="2"/>
-              <a:buChar char="Ø"/>
-            </a:pPr>
-            <a:r>
-              <a:rPr lang="en-IN" sz="1800" dirty="0">
+              <a:t>Analyses of beer reviews features data -</a:t>
+            </a:r>
+          </a:p>
+          <a:p>
+            <a:pPr lvl="1"/>
+            <a:r>
+              <a:rPr lang="en-IN" sz="2300" dirty="0">
                 <a:effectLst/>
                 <a:latin typeface="Calibri" panose="020F0502020204030204" pitchFamily="34" charset="0"/>
                 <a:ea typeface="Calibri" panose="020F0502020204030204" pitchFamily="34" charset="0"/>
@@ -4568,12 +4719,9 @@
             </a:r>
           </a:p>
           <a:p>
-            <a:pPr lvl="1">
-              <a:buFont typeface="Wingdings" panose="05000000000000000000" pitchFamily="2" charset="2"/>
-              <a:buChar char="Ø"/>
-            </a:pPr>
-            <a:r>
-              <a:rPr lang="en-IN" sz="1800" dirty="0">
+            <a:pPr lvl="1"/>
+            <a:r>
+              <a:rPr lang="en-IN" sz="2300" dirty="0">
                 <a:effectLst/>
                 <a:latin typeface="Calibri" panose="020F0502020204030204" pitchFamily="34" charset="0"/>
                 <a:ea typeface="Calibri" panose="020F0502020204030204" pitchFamily="34" charset="0"/>
@@ -4582,7 +4730,7 @@
               <a:t>Such as </a:t>
             </a:r>
             <a:r>
-              <a:rPr lang="en-IN" sz="1800" dirty="0" err="1">
+              <a:rPr lang="en-IN" sz="2300" dirty="0" err="1">
                 <a:effectLst/>
                 <a:latin typeface="Calibri" panose="020F0502020204030204" pitchFamily="34" charset="0"/>
                 <a:ea typeface="Calibri" panose="020F0502020204030204" pitchFamily="34" charset="0"/>
@@ -4590,7 +4738,7 @@
               </a:rPr>
               <a:t>review_overall,review_appearance,review_taste,review_aroma</a:t>
             </a:r>
-            <a:endParaRPr lang="en-IN" sz="1800" dirty="0">
+            <a:endParaRPr lang="en-IN" sz="2300" dirty="0">
               <a:effectLst/>
               <a:latin typeface="Calibri" panose="020F0502020204030204" pitchFamily="34" charset="0"/>
               <a:ea typeface="Calibri" panose="020F0502020204030204" pitchFamily="34" charset="0"/>
@@ -4598,12 +4746,9 @@
             </a:endParaRPr>
           </a:p>
           <a:p>
-            <a:pPr lvl="1">
-              <a:buFont typeface="Wingdings" panose="05000000000000000000" pitchFamily="2" charset="2"/>
-              <a:buChar char="Ø"/>
-            </a:pPr>
-            <a:r>
-              <a:rPr lang="en-IN" sz="1800" dirty="0">
+            <a:pPr lvl="1"/>
+            <a:r>
+              <a:rPr lang="en-IN" sz="2300" dirty="0">
                 <a:effectLst/>
                 <a:latin typeface="Calibri" panose="020F0502020204030204" pitchFamily="34" charset="0"/>
                 <a:ea typeface="Calibri" panose="020F0502020204030204" pitchFamily="34" charset="0"/>
@@ -4613,19 +4758,16 @@
             </a:r>
           </a:p>
           <a:p>
-            <a:pPr lvl="1">
-              <a:buFont typeface="Wingdings" panose="05000000000000000000" pitchFamily="2" charset="2"/>
-              <a:buChar char="Ø"/>
-            </a:pPr>
-            <a:r>
-              <a:rPr lang="en-IN" sz="1800" dirty="0">
+            <a:pPr lvl="1"/>
+            <a:r>
+              <a:rPr lang="en-IN" sz="2300" dirty="0">
                 <a:latin typeface="Calibri" panose="020F0502020204030204" pitchFamily="34" charset="0"/>
                 <a:ea typeface="Calibri" panose="020F0502020204030204" pitchFamily="34" charset="0"/>
                 <a:cs typeface="Times New Roman" panose="02020603050405020304" pitchFamily="18" charset="0"/>
               </a:rPr>
               <a:t>Find pattern from plots</a:t>
             </a:r>
-            <a:endParaRPr lang="en-IN" sz="1800" dirty="0">
+            <a:endParaRPr lang="en-IN" sz="2300" dirty="0">
               <a:effectLst/>
               <a:latin typeface="Calibri" panose="020F0502020204030204" pitchFamily="34" charset="0"/>
               <a:ea typeface="Calibri" panose="020F0502020204030204" pitchFamily="34" charset="0"/>
@@ -4743,7 +4885,83 @@
             </a:pPr>
             <a:r>
               <a:rPr lang="en-US" sz="2000" dirty="0"/>
-              <a:t>Logic:-</a:t>
+              <a:t>Ans.</a:t>
+            </a:r>
+            <a:r>
+              <a:rPr lang="en-US" sz="2000" dirty="0">
+                <a:solidFill>
+                  <a:srgbClr val="333333"/>
+                </a:solidFill>
+              </a:rPr>
+              <a:t> </a:t>
+            </a:r>
+            <a:r>
+              <a:rPr lang="en-US" sz="2000" b="1" dirty="0">
+                <a:solidFill>
+                  <a:srgbClr val="333333"/>
+                </a:solidFill>
+              </a:rPr>
+              <a:t>The top 3 breweries are</a:t>
+            </a:r>
+            <a:r>
+              <a:rPr lang="en-US" sz="2000" dirty="0">
+                <a:solidFill>
+                  <a:srgbClr val="333333"/>
+                </a:solidFill>
+              </a:rPr>
+              <a:t>-</a:t>
+            </a:r>
+          </a:p>
+          <a:p>
+            <a:pPr marL="800100" lvl="1" indent="-342900">
+              <a:buFont typeface="+mj-lt"/>
+              <a:buAutoNum type="arabicPeriod"/>
+            </a:pPr>
+            <a:r>
+              <a:rPr lang="de-DE" sz="1600" dirty="0">
+                <a:solidFill>
+                  <a:srgbClr val="333333"/>
+                </a:solidFill>
+              </a:rPr>
+              <a:t> Schorschbräu Schorschbock 57%</a:t>
+            </a:r>
+          </a:p>
+          <a:p>
+            <a:pPr marL="800100" lvl="1" indent="-342900">
+              <a:buFont typeface="+mj-lt"/>
+              <a:buAutoNum type="arabicPeriod"/>
+            </a:pPr>
+            <a:r>
+              <a:rPr lang="de-DE" sz="1600" dirty="0">
+                <a:solidFill>
+                  <a:srgbClr val="333333"/>
+                </a:solidFill>
+              </a:rPr>
+              <a:t> Schorschbräu Schorschbock 43%	</a:t>
+            </a:r>
+          </a:p>
+          <a:p>
+            <a:pPr marL="800100" lvl="1" indent="-342900">
+              <a:buFont typeface="+mj-lt"/>
+              <a:buAutoNum type="arabicPeriod"/>
+            </a:pPr>
+            <a:r>
+              <a:rPr lang="de-DE" sz="1600" dirty="0">
+                <a:solidFill>
+                  <a:srgbClr val="333333"/>
+                </a:solidFill>
+              </a:rPr>
+              <a:t> Schorschbräu Schorschbock 40%	</a:t>
+            </a:r>
+            <a:endParaRPr lang="en-US" dirty="0"/>
+          </a:p>
+          <a:p>
+            <a:pPr marL="0" indent="0">
+              <a:buNone/>
+            </a:pPr>
+            <a:r>
+              <a:rPr lang="en-US" sz="2000" dirty="0"/>
+              <a:t>Logic-</a:t>
             </a:r>
           </a:p>
           <a:p>
@@ -4764,7 +4982,7 @@
                 </a:solidFill>
                 <a:effectLst/>
               </a:rPr>
-              <a:t>The </a:t>
+              <a:t>The relationship between </a:t>
             </a:r>
             <a:r>
               <a:rPr lang="en-US" sz="1800" b="0" i="0" dirty="0" err="1">
@@ -4773,7 +4991,7 @@
                 </a:solidFill>
                 <a:effectLst/>
               </a:rPr>
-              <a:t>realtionship</a:t>
+              <a:t>beer_name</a:t>
             </a:r>
             <a:r>
               <a:rPr lang="en-US" sz="1800" b="0" i="0" dirty="0">
@@ -4782,7 +5000,7 @@
                 </a:solidFill>
                 <a:effectLst/>
               </a:rPr>
-              <a:t> between </a:t>
+              <a:t> and </a:t>
             </a:r>
             <a:r>
               <a:rPr lang="en-US" sz="1800" b="0" i="0" dirty="0" err="1">
@@ -4791,7 +5009,15 @@
                 </a:solidFill>
                 <a:effectLst/>
               </a:rPr>
-              <a:t>beer_name</a:t>
+              <a:t>beer_</a:t>
+            </a:r>
+            <a:r>
+              <a:rPr lang="en-US" sz="1800" dirty="0" err="1">
+                <a:solidFill>
+                  <a:srgbClr val="333333"/>
+                </a:solidFill>
+              </a:rPr>
+              <a:t>ABV</a:t>
             </a:r>
             <a:r>
               <a:rPr lang="en-US" sz="1800" b="0" i="0" dirty="0">
@@ -4800,7 +5026,7 @@
                 </a:solidFill>
                 <a:effectLst/>
               </a:rPr>
-              <a:t> and </a:t>
+              <a:t> is </a:t>
             </a:r>
             <a:r>
               <a:rPr lang="en-US" sz="1800" b="0" i="0" dirty="0" err="1">
@@ -4809,15 +5035,24 @@
                 </a:solidFill>
                 <a:effectLst/>
               </a:rPr>
-              <a:t>beer_</a:t>
-            </a:r>
-            <a:r>
-              <a:rPr lang="en-US" sz="1800" dirty="0" err="1">
+              <a:t>required,then</a:t>
+            </a:r>
+            <a:r>
+              <a:rPr lang="en-US" sz="1800" b="0" i="0" dirty="0">
                 <a:solidFill>
                   <a:srgbClr val="333333"/>
                 </a:solidFill>
-              </a:rPr>
-              <a:t>ABV</a:t>
+                <a:effectLst/>
+              </a:rPr>
+              <a:t> we remove any duplicate value </a:t>
+            </a:r>
+            <a:r>
+              <a:rPr lang="en-US" sz="1800" dirty="0">
+                <a:solidFill>
+                  <a:srgbClr val="333333"/>
+                </a:solidFill>
+              </a:rPr>
+              <a:t>after we </a:t>
             </a:r>
             <a:r>
               <a:rPr lang="en-US" sz="1800" b="0" i="0" dirty="0">
@@ -4826,7 +5061,7 @@
                 </a:solidFill>
                 <a:effectLst/>
               </a:rPr>
-              <a:t> is </a:t>
+              <a:t>sort the values according to </a:t>
             </a:r>
             <a:r>
               <a:rPr lang="en-US" sz="1800" b="0" i="0" dirty="0" err="1">
@@ -4835,7 +5070,7 @@
                 </a:solidFill>
                 <a:effectLst/>
               </a:rPr>
-              <a:t>required,then</a:t>
+              <a:t>beer_ABV</a:t>
             </a:r>
             <a:r>
               <a:rPr lang="en-US" sz="1800" b="0" i="0" dirty="0">
@@ -4844,7 +5079,7 @@
                 </a:solidFill>
                 <a:effectLst/>
               </a:rPr>
-              <a:t> we remove any duplicate value </a:t>
+              <a:t> column </a:t>
             </a:r>
             <a:r>
               <a:rPr lang="en-US" sz="1800" dirty="0">
@@ -4852,115 +5087,8 @@
                   <a:srgbClr val="333333"/>
                 </a:solidFill>
               </a:rPr>
-              <a:t>after we </a:t>
-            </a:r>
-            <a:r>
-              <a:rPr lang="en-US" sz="1800" b="0" i="0" dirty="0">
-                <a:solidFill>
-                  <a:srgbClr val="333333"/>
-                </a:solidFill>
-                <a:effectLst/>
-              </a:rPr>
-              <a:t>sort the values according to </a:t>
-            </a:r>
-            <a:r>
-              <a:rPr lang="en-US" sz="1800" b="0" i="0" dirty="0" err="1">
-                <a:solidFill>
-                  <a:srgbClr val="333333"/>
-                </a:solidFill>
-                <a:effectLst/>
-              </a:rPr>
-              <a:t>beer_ABV</a:t>
-            </a:r>
-            <a:r>
-              <a:rPr lang="en-US" sz="1800" b="0" i="0" dirty="0">
-                <a:solidFill>
-                  <a:srgbClr val="333333"/>
-                </a:solidFill>
-                <a:effectLst/>
-              </a:rPr>
-              <a:t> column </a:t>
-            </a:r>
-            <a:r>
-              <a:rPr lang="en-US" sz="1800" dirty="0">
-                <a:solidFill>
-                  <a:srgbClr val="333333"/>
-                </a:solidFill>
-              </a:rPr>
               <a:t>in decreasing manner to find the highest value of ABV</a:t>
             </a:r>
-          </a:p>
-          <a:p>
-            <a:r>
-              <a:rPr lang="en-US" sz="1800" b="0" i="0" dirty="0">
-                <a:solidFill>
-                  <a:srgbClr val="333333"/>
-                </a:solidFill>
-                <a:effectLst/>
-              </a:rPr>
-              <a:t>Then we show top 3 brewerie</a:t>
-            </a:r>
-            <a:r>
-              <a:rPr lang="en-US" sz="1800" dirty="0">
-                <a:solidFill>
-                  <a:srgbClr val="333333"/>
-                </a:solidFill>
-              </a:rPr>
-              <a:t>s of strongest beers.</a:t>
-            </a:r>
-          </a:p>
-          <a:p>
-            <a:pPr>
-              <a:buFont typeface="Wingdings" panose="05000000000000000000" pitchFamily="2" charset="2"/>
-              <a:buChar char="Ø"/>
-            </a:pPr>
-            <a:r>
-              <a:rPr lang="en-US" sz="2000" dirty="0">
-                <a:solidFill>
-                  <a:srgbClr val="333333"/>
-                </a:solidFill>
-              </a:rPr>
-              <a:t>The top 3 breweries are:-</a:t>
-            </a:r>
-          </a:p>
-          <a:p>
-            <a:pPr lvl="1"/>
-            <a:r>
-              <a:rPr lang="de-DE" sz="1600" dirty="0">
-                <a:solidFill>
-                  <a:srgbClr val="333333"/>
-                </a:solidFill>
-              </a:rPr>
-              <a:t> Schorschbräu Schorschbock 57%</a:t>
-            </a:r>
-          </a:p>
-          <a:p>
-            <a:pPr lvl="1"/>
-            <a:r>
-              <a:rPr lang="de-DE" sz="1600" dirty="0">
-                <a:solidFill>
-                  <a:srgbClr val="333333"/>
-                </a:solidFill>
-              </a:rPr>
-              <a:t> Schorschbräu Schorschbock 43%	</a:t>
-            </a:r>
-          </a:p>
-          <a:p>
-            <a:pPr lvl="1"/>
-            <a:r>
-              <a:rPr lang="de-DE" sz="1600" dirty="0">
-                <a:solidFill>
-                  <a:srgbClr val="333333"/>
-                </a:solidFill>
-              </a:rPr>
-              <a:t> Schorschbräu Schorschbock 40%	</a:t>
-            </a:r>
-            <a:endParaRPr lang="en-US" sz="1600" b="0" i="0" dirty="0">
-              <a:solidFill>
-                <a:srgbClr val="333333"/>
-              </a:solidFill>
-              <a:effectLst/>
-            </a:endParaRPr>
           </a:p>
           <a:p>
             <a:endParaRPr lang="en-US" sz="2000" dirty="0"/>
@@ -4999,10 +5127,46 @@
       </p:grpSpPr>
       <p:sp>
         <p:nvSpPr>
+          <p:cNvPr id="2" name="Title 1">
+            <a:extLst>
+              <a:ext uri="{FF2B5EF4-FFF2-40B4-BE49-F238E27FC236}">
+                <a16:creationId xmlns:a16="http://schemas.microsoft.com/office/drawing/2014/main" id="{C9E6F332-56DF-42E4-B1BC-0B0970E54B98}"/>
+              </a:ext>
+            </a:extLst>
+          </p:cNvPr>
+          <p:cNvSpPr>
+            <a:spLocks noGrp="1"/>
+          </p:cNvSpPr>
+          <p:nvPr>
+            <p:ph type="title"/>
+          </p:nvPr>
+        </p:nvSpPr>
+        <p:spPr/>
+        <p:txBody>
+          <a:bodyPr/>
+          <a:lstStyle/>
+          <a:p>
+            <a:r>
+              <a:rPr lang="en-IN" sz="3600" dirty="0"/>
+              <a:t>Business</a:t>
+            </a:r>
+            <a:r>
+              <a:rPr lang="en-IN" dirty="0"/>
+              <a:t> </a:t>
+            </a:r>
+            <a:r>
+              <a:rPr lang="en-IN" sz="3600" dirty="0"/>
+              <a:t>problems continued…</a:t>
+            </a:r>
+          </a:p>
+        </p:txBody>
+      </p:sp>
+      <p:sp>
+        <p:nvSpPr>
           <p:cNvPr id="3" name="Content Placeholder 2">
             <a:extLst>
               <a:ext uri="{FF2B5EF4-FFF2-40B4-BE49-F238E27FC236}">
-                <a16:creationId xmlns:a16="http://schemas.microsoft.com/office/drawing/2014/main" id="{333FEE30-3F42-416F-BC2D-D1045E47B17D}"/>
+                <a16:creationId xmlns:a16="http://schemas.microsoft.com/office/drawing/2014/main" id="{91EDB5C8-BA0E-4029-947E-21352312AC94}"/>
               </a:ext>
             </a:extLst>
           </p:cNvPr>
@@ -5013,14 +5177,11 @@
             <p:ph idx="1"/>
           </p:nvPr>
         </p:nvSpPr>
-        <p:spPr>
-          <a:xfrm>
-            <a:off x="731667" y="760305"/>
-            <a:ext cx="10906957" cy="5019058"/>
-          </a:xfrm>
-        </p:spPr>
-        <p:txBody>
-          <a:bodyPr/>
+        <p:spPr/>
+        <p:txBody>
+          <a:bodyPr>
+            <a:normAutofit/>
+          </a:bodyPr>
           <a:lstStyle/>
           <a:p>
             <a:pPr marL="0" indent="0">
@@ -5028,15 +5189,24 @@
             </a:pPr>
             <a:r>
               <a:rPr lang="en-US" sz="2000" dirty="0"/>
-              <a:t>2</a:t>
-            </a:r>
-            <a:r>
-              <a:rPr lang="en-US" dirty="0"/>
-              <a:t>.</a:t>
-            </a:r>
+              <a:t>2.Which year did beers enjoy the highest ratings? </a:t>
+            </a:r>
+          </a:p>
+          <a:p>
+            <a:pPr marL="0" indent="0">
+              <a:buNone/>
+            </a:pPr>
             <a:r>
               <a:rPr lang="en-US" sz="2000" dirty="0"/>
-              <a:t>Which year did beers enjoy the highest ratings? </a:t>
+              <a:t>Ans.</a:t>
+            </a:r>
+            <a:r>
+              <a:rPr lang="en-US" sz="2000" dirty="0">
+                <a:solidFill>
+                  <a:srgbClr val="333333"/>
+                </a:solidFill>
+              </a:rPr>
+              <a:t> Year 2011 has the highest rating of 4.0</a:t>
             </a:r>
           </a:p>
           <a:p>
@@ -5045,7 +5215,7 @@
             </a:pPr>
             <a:r>
               <a:rPr lang="en-US" sz="2000" dirty="0"/>
-              <a:t>Logic:-</a:t>
+              <a:t>Logic:</a:t>
             </a:r>
           </a:p>
           <a:p>
@@ -5055,7 +5225,7 @@
               </a:lnSpc>
             </a:pPr>
             <a:r>
-              <a:rPr lang="en-US" sz="2000" dirty="0"/>
+              <a:rPr lang="en-US" sz="1800" dirty="0"/>
               <a:t>Here we will find the highest rating year so first we will check datatype of review time column if its not datetime datatype then convert into datetime datatype.</a:t>
             </a:r>
           </a:p>
@@ -5066,7 +5236,7 @@
               </a:lnSpc>
             </a:pPr>
             <a:r>
-              <a:rPr lang="en-US" sz="2000" dirty="0">
+              <a:rPr lang="en-US" sz="1800" dirty="0">
                 <a:solidFill>
                   <a:srgbClr val="333333"/>
                 </a:solidFill>
@@ -5074,7 +5244,7 @@
               <a:t>Here we</a:t>
             </a:r>
             <a:r>
-              <a:rPr lang="en-US" sz="2000" b="0" i="0" dirty="0">
+              <a:rPr lang="en-US" sz="1800" b="0" i="0" dirty="0">
                 <a:solidFill>
                   <a:srgbClr val="333333"/>
                 </a:solidFill>
@@ -5083,7 +5253,7 @@
               <a:t> extract year from review time column after this we will compare feature with </a:t>
             </a:r>
             <a:r>
-              <a:rPr lang="en-US" sz="2000" b="0" i="0" dirty="0" err="1">
+              <a:rPr lang="en-US" sz="1800" b="0" i="0" dirty="0" err="1">
                 <a:solidFill>
                   <a:srgbClr val="333333"/>
                 </a:solidFill>
@@ -5092,7 +5262,7 @@
               <a:t>review_overall</a:t>
             </a:r>
             <a:r>
-              <a:rPr lang="en-US" sz="2000" b="0" i="0" dirty="0">
+              <a:rPr lang="en-US" sz="1800" b="0" i="0" dirty="0">
                 <a:solidFill>
                   <a:srgbClr val="333333"/>
                 </a:solidFill>
@@ -5108,50 +5278,20 @@
               </a:lnSpc>
             </a:pPr>
             <a:r>
-              <a:rPr lang="en-US" sz="2000" dirty="0">
+              <a:rPr lang="en-US" sz="1800" dirty="0">
                 <a:solidFill>
                   <a:srgbClr val="333333"/>
                 </a:solidFill>
               </a:rPr>
               <a:t>Then we compare all the years for each ratings to check for highest rating.</a:t>
             </a:r>
-          </a:p>
-          <a:p>
-            <a:pPr>
-              <a:lnSpc>
-                <a:spcPct val="100000"/>
-              </a:lnSpc>
-            </a:pPr>
-            <a:r>
-              <a:rPr lang="en-US" sz="2000" b="0" i="0" dirty="0">
-                <a:solidFill>
-                  <a:srgbClr val="333333"/>
-                </a:solidFill>
-                <a:effectLst/>
-              </a:rPr>
-              <a:t>After comparing we found out that 2011 is the most highest rating of 4.0</a:t>
-            </a:r>
-          </a:p>
-          <a:p>
-            <a:pPr marL="0" indent="0">
-              <a:lnSpc>
-                <a:spcPct val="150000"/>
-              </a:lnSpc>
-              <a:buNone/>
-            </a:pPr>
-            <a:endParaRPr lang="en-US" sz="1800" b="0" i="0" dirty="0">
-              <a:solidFill>
-                <a:srgbClr val="333333"/>
-              </a:solidFill>
-              <a:effectLst/>
-            </a:endParaRPr>
           </a:p>
         </p:txBody>
       </p:sp>
     </p:spTree>
     <p:extLst>
       <p:ext uri="{BB962C8B-B14F-4D97-AF65-F5344CB8AC3E}">
-        <p14:creationId xmlns:p14="http://schemas.microsoft.com/office/powerpoint/2010/main" val="570401798"/>
+        <p14:creationId xmlns:p14="http://schemas.microsoft.com/office/powerpoint/2010/main" val="1306132461"/>
       </p:ext>
     </p:extLst>
   </p:cSld>
@@ -5180,10 +5320,46 @@
       </p:grpSpPr>
       <p:sp>
         <p:nvSpPr>
+          <p:cNvPr id="2" name="Title 1">
+            <a:extLst>
+              <a:ext uri="{FF2B5EF4-FFF2-40B4-BE49-F238E27FC236}">
+                <a16:creationId xmlns:a16="http://schemas.microsoft.com/office/drawing/2014/main" id="{C9E6F332-56DF-42E4-B1BC-0B0970E54B98}"/>
+              </a:ext>
+            </a:extLst>
+          </p:cNvPr>
+          <p:cNvSpPr>
+            <a:spLocks noGrp="1"/>
+          </p:cNvSpPr>
+          <p:nvPr>
+            <p:ph type="title"/>
+          </p:nvPr>
+        </p:nvSpPr>
+        <p:spPr/>
+        <p:txBody>
+          <a:bodyPr/>
+          <a:lstStyle/>
+          <a:p>
+            <a:r>
+              <a:rPr lang="en-IN" sz="3600" dirty="0"/>
+              <a:t>Business</a:t>
+            </a:r>
+            <a:r>
+              <a:rPr lang="en-IN" dirty="0"/>
+              <a:t> </a:t>
+            </a:r>
+            <a:r>
+              <a:rPr lang="en-IN" sz="3600" dirty="0"/>
+              <a:t>problems continued…</a:t>
+            </a:r>
+          </a:p>
+        </p:txBody>
+      </p:sp>
+      <p:sp>
+        <p:nvSpPr>
           <p:cNvPr id="3" name="Content Placeholder 2">
             <a:extLst>
               <a:ext uri="{FF2B5EF4-FFF2-40B4-BE49-F238E27FC236}">
-                <a16:creationId xmlns:a16="http://schemas.microsoft.com/office/drawing/2014/main" id="{5A52FEB6-DB33-4D9B-99B9-878E1DC0D6DF}"/>
+                <a16:creationId xmlns:a16="http://schemas.microsoft.com/office/drawing/2014/main" id="{91EDB5C8-BA0E-4029-947E-21352312AC94}"/>
               </a:ext>
             </a:extLst>
           </p:cNvPr>
@@ -5194,12 +5370,7 @@
             <p:ph idx="1"/>
           </p:nvPr>
         </p:nvSpPr>
-        <p:spPr>
-          <a:xfrm>
-            <a:off x="900344" y="733670"/>
-            <a:ext cx="10515600" cy="4859261"/>
-          </a:xfrm>
-        </p:spPr>
+        <p:spPr/>
         <p:txBody>
           <a:bodyPr>
             <a:normAutofit/>
@@ -5220,7 +5391,38 @@
             </a:pPr>
             <a:r>
               <a:rPr lang="en-US" sz="2000" dirty="0"/>
-              <a:t>Logic:-</a:t>
+              <a:t>Ans.</a:t>
+            </a:r>
+            <a:r>
+              <a:rPr lang="en-US" sz="2000" dirty="0">
+                <a:solidFill>
+                  <a:srgbClr val="333333"/>
+                </a:solidFill>
+              </a:rPr>
+              <a:t> </a:t>
+            </a:r>
+            <a:r>
+              <a:rPr lang="en-US" sz="2000" b="1" dirty="0">
+                <a:solidFill>
+                  <a:srgbClr val="333333"/>
+                </a:solidFill>
+              </a:rPr>
+              <a:t>Aroma-&gt;taste-&gt;palette-&gt;appearance(importance from high to low)</a:t>
+            </a:r>
+            <a:endParaRPr lang="en-US" sz="2000" b="1" i="0" dirty="0">
+              <a:solidFill>
+                <a:srgbClr val="333333"/>
+              </a:solidFill>
+              <a:effectLst/>
+            </a:endParaRPr>
+          </a:p>
+          <a:p>
+            <a:pPr marL="0" indent="0">
+              <a:buNone/>
+            </a:pPr>
+            <a:r>
+              <a:rPr lang="en-US" sz="2000" dirty="0"/>
+              <a:t>Logic:</a:t>
             </a:r>
           </a:p>
           <a:p>
@@ -5230,7 +5432,7 @@
               </a:lnSpc>
             </a:pPr>
             <a:r>
-              <a:rPr lang="en-US" sz="2200" b="0" i="0" dirty="0">
+              <a:rPr lang="en-US" sz="2000" b="0" i="0" dirty="0">
                 <a:solidFill>
                   <a:srgbClr val="333333"/>
                 </a:solidFill>
@@ -5239,14 +5441,14 @@
               <a:t>Here</a:t>
             </a:r>
             <a:r>
-              <a:rPr lang="en-US" sz="2200" dirty="0">
+              <a:rPr lang="en-US" sz="2000" dirty="0">
                 <a:solidFill>
                   <a:srgbClr val="333333"/>
                 </a:solidFill>
               </a:rPr>
               <a:t> we will use correlation matrix to find most important factor</a:t>
             </a:r>
-            <a:endParaRPr lang="en-US" sz="2200" b="0" i="0" dirty="0">
+            <a:endParaRPr lang="en-US" sz="2000" b="0" i="0" dirty="0">
               <a:solidFill>
                 <a:srgbClr val="333333"/>
               </a:solidFill>
@@ -5260,59 +5462,21 @@
               </a:lnSpc>
             </a:pPr>
             <a:r>
-              <a:rPr lang="en-US" sz="2200" b="0" i="0" dirty="0">
+              <a:rPr lang="en-US" sz="2000" b="0" i="0" dirty="0">
                 <a:solidFill>
                   <a:srgbClr val="333333"/>
                 </a:solidFill>
                 <a:effectLst/>
               </a:rPr>
-              <a:t>After  applying correlation we found out that aroma has the highest correlation of (0.78) then followed by taste(0.69) then palette(0.60) then appearance(0.48).</a:t>
-            </a:r>
-          </a:p>
-          <a:p>
-            <a:pPr>
-              <a:lnSpc>
-                <a:spcPct val="100000"/>
-              </a:lnSpc>
-            </a:pPr>
-            <a:r>
-              <a:rPr lang="en-US" sz="2200" dirty="0">
-                <a:solidFill>
-                  <a:srgbClr val="333333"/>
-                </a:solidFill>
-              </a:rPr>
-              <a:t>Aroma-&gt;taste-&gt;palette-&gt;appearance(importance from high to low)</a:t>
-            </a:r>
-            <a:endParaRPr lang="en-US" sz="2200" b="0" i="0" dirty="0">
-              <a:solidFill>
-                <a:srgbClr val="333333"/>
-              </a:solidFill>
-              <a:effectLst/>
-            </a:endParaRPr>
-          </a:p>
-          <a:p>
-            <a:pPr marL="0" indent="0">
-              <a:lnSpc>
-                <a:spcPct val="150000"/>
-              </a:lnSpc>
-              <a:buNone/>
-            </a:pPr>
-            <a:endParaRPr lang="en-US" sz="2800" b="0" i="0" dirty="0">
-              <a:solidFill>
-                <a:srgbClr val="333333"/>
-              </a:solidFill>
-              <a:effectLst/>
-            </a:endParaRPr>
-          </a:p>
-          <a:p>
-            <a:endParaRPr lang="en-IN" dirty="0"/>
+              <a:t>After applied correlation matrix we found out that aroma has the highest correlation of (0.78) then followed by taste(0.69) then palette(0.60) then appearance(0.48)</a:t>
+            </a:r>
           </a:p>
         </p:txBody>
       </p:sp>
     </p:spTree>
     <p:extLst>
       <p:ext uri="{BB962C8B-B14F-4D97-AF65-F5344CB8AC3E}">
-        <p14:creationId xmlns:p14="http://schemas.microsoft.com/office/powerpoint/2010/main" val="2212022230"/>
+        <p14:creationId xmlns:p14="http://schemas.microsoft.com/office/powerpoint/2010/main" val="2103679545"/>
       </p:ext>
     </p:extLst>
   </p:cSld>
@@ -5341,10 +5505,46 @@
       </p:grpSpPr>
       <p:sp>
         <p:nvSpPr>
+          <p:cNvPr id="2" name="Title 1">
+            <a:extLst>
+              <a:ext uri="{FF2B5EF4-FFF2-40B4-BE49-F238E27FC236}">
+                <a16:creationId xmlns:a16="http://schemas.microsoft.com/office/drawing/2014/main" id="{C9E6F332-56DF-42E4-B1BC-0B0970E54B98}"/>
+              </a:ext>
+            </a:extLst>
+          </p:cNvPr>
+          <p:cNvSpPr>
+            <a:spLocks noGrp="1"/>
+          </p:cNvSpPr>
+          <p:nvPr>
+            <p:ph type="title"/>
+          </p:nvPr>
+        </p:nvSpPr>
+        <p:spPr/>
+        <p:txBody>
+          <a:bodyPr/>
+          <a:lstStyle/>
+          <a:p>
+            <a:r>
+              <a:rPr lang="en-IN" sz="3600" dirty="0"/>
+              <a:t>Business</a:t>
+            </a:r>
+            <a:r>
+              <a:rPr lang="en-IN" dirty="0"/>
+              <a:t> </a:t>
+            </a:r>
+            <a:r>
+              <a:rPr lang="en-IN" sz="3600" dirty="0"/>
+              <a:t>problems continued…</a:t>
+            </a:r>
+          </a:p>
+        </p:txBody>
+      </p:sp>
+      <p:sp>
+        <p:nvSpPr>
           <p:cNvPr id="3" name="Content Placeholder 2">
             <a:extLst>
               <a:ext uri="{FF2B5EF4-FFF2-40B4-BE49-F238E27FC236}">
-                <a16:creationId xmlns:a16="http://schemas.microsoft.com/office/drawing/2014/main" id="{FA3251D2-66BE-4EAE-857C-C86032CC669A}"/>
+                <a16:creationId xmlns:a16="http://schemas.microsoft.com/office/drawing/2014/main" id="{91EDB5C8-BA0E-4029-947E-21352312AC94}"/>
               </a:ext>
             </a:extLst>
           </p:cNvPr>
@@ -5355,12 +5555,7 @@
             <p:ph idx="1"/>
           </p:nvPr>
         </p:nvSpPr>
-        <p:spPr>
-          <a:xfrm>
-            <a:off x="838200" y="937858"/>
-            <a:ext cx="10515600" cy="4351338"/>
-          </a:xfrm>
-        </p:spPr>
+        <p:spPr/>
         <p:txBody>
           <a:bodyPr>
             <a:normAutofit/>
@@ -5371,7 +5566,7 @@
               <a:buNone/>
             </a:pPr>
             <a:r>
-              <a:rPr lang="en-US" sz="2200" i="0" dirty="0">
+              <a:rPr lang="en-US" sz="2000" i="0" dirty="0">
                 <a:solidFill>
                   <a:srgbClr val="000000"/>
                 </a:solidFill>
@@ -5385,36 +5580,141 @@
               <a:buNone/>
             </a:pPr>
             <a:r>
-              <a:rPr lang="en-US" sz="2200" dirty="0">
+              <a:rPr lang="en-US" sz="2000" dirty="0"/>
+              <a:t>Ans.</a:t>
+            </a:r>
+            <a:r>
+              <a:rPr lang="en-US" sz="2000" dirty="0">
+                <a:solidFill>
+                  <a:srgbClr val="333333"/>
+                </a:solidFill>
+              </a:rPr>
+              <a:t> </a:t>
+            </a:r>
+            <a:r>
+              <a:rPr lang="en-US" sz="2000" b="1" i="0" dirty="0">
                 <a:solidFill>
                   <a:srgbClr val="000000"/>
                 </a:solidFill>
-              </a:rPr>
-              <a:t>Logic:-</a:t>
-            </a:r>
-          </a:p>
-          <a:p>
-            <a:r>
-              <a:rPr lang="en-US" sz="2200" dirty="0">
+                <a:effectLst/>
+              </a:rPr>
+              <a:t>These are top 3 recommendations are:</a:t>
+            </a:r>
+          </a:p>
+          <a:p>
+            <a:pPr marL="800100" lvl="1" indent="-342900">
+              <a:buFont typeface="+mj-lt"/>
+              <a:buAutoNum type="arabicPeriod"/>
+            </a:pPr>
+            <a:r>
+              <a:rPr lang="en-US" sz="1600" b="1" i="0" dirty="0">
                 <a:solidFill>
                   <a:srgbClr val="000000"/>
                 </a:solidFill>
-              </a:rPr>
-              <a:t>Here we will recommend the beer based on a high ratings in every review column to recommend top three beer.</a:t>
-            </a:r>
-          </a:p>
-          <a:p>
-            <a:r>
-              <a:rPr lang="en-US" sz="2200" i="0" dirty="0">
+                <a:effectLst/>
+              </a:rPr>
+              <a:t> </a:t>
+            </a:r>
+            <a:r>
+              <a:rPr lang="en-US" sz="1600" i="0" dirty="0" err="1">
                 <a:solidFill>
                   <a:srgbClr val="000000"/>
                 </a:solidFill>
                 <a:effectLst/>
               </a:rPr>
+              <a:t>Edsten</a:t>
+            </a:r>
+            <a:r>
+              <a:rPr lang="en-US" sz="1600" i="0" dirty="0">
+                <a:solidFill>
+                  <a:srgbClr val="000000"/>
+                </a:solidFill>
+                <a:effectLst/>
+              </a:rPr>
+              <a:t> Triple-Wit	</a:t>
+            </a:r>
+          </a:p>
+          <a:p>
+            <a:pPr marL="800100" lvl="1" indent="-342900">
+              <a:buFont typeface="+mj-lt"/>
+              <a:buAutoNum type="arabicPeriod"/>
+            </a:pPr>
+            <a:r>
+              <a:rPr lang="en-US" sz="1600" dirty="0">
+                <a:solidFill>
+                  <a:srgbClr val="000000"/>
+                </a:solidFill>
+              </a:rPr>
+              <a:t> </a:t>
+            </a:r>
+            <a:r>
+              <a:rPr lang="en-US" sz="1600" i="0" dirty="0">
+                <a:solidFill>
+                  <a:srgbClr val="000000"/>
+                </a:solidFill>
+                <a:effectLst/>
+              </a:rPr>
+              <a:t>Old Gander Barley Wine </a:t>
+            </a:r>
+          </a:p>
+          <a:p>
+            <a:pPr marL="800100" lvl="1" indent="-342900">
+              <a:buFont typeface="+mj-lt"/>
+              <a:buAutoNum type="arabicPeriod"/>
+            </a:pPr>
+            <a:r>
+              <a:rPr lang="en-US" sz="1600" dirty="0">
+                <a:solidFill>
+                  <a:srgbClr val="000000"/>
+                </a:solidFill>
+              </a:rPr>
+              <a:t> </a:t>
+            </a:r>
+            <a:r>
+              <a:rPr lang="en-US" sz="1600" i="0" dirty="0">
+                <a:solidFill>
+                  <a:srgbClr val="000000"/>
+                </a:solidFill>
+                <a:effectLst/>
+              </a:rPr>
+              <a:t>Rogue Black Brutal</a:t>
+            </a:r>
+          </a:p>
+          <a:p>
+            <a:pPr marL="0" indent="0">
+              <a:buNone/>
+            </a:pPr>
+            <a:r>
+              <a:rPr lang="en-US" sz="2000" dirty="0">
+                <a:solidFill>
+                  <a:srgbClr val="000000"/>
+                </a:solidFill>
+              </a:rPr>
+              <a:t>Logic:</a:t>
+            </a:r>
+          </a:p>
+          <a:p>
+            <a:r>
+              <a:rPr lang="en-US" sz="1800" dirty="0">
+                <a:solidFill>
+                  <a:srgbClr val="000000"/>
+                </a:solidFill>
+              </a:rPr>
+              <a:t>Here we will recommend the beer based on a high ratings of users to recommend top three beer</a:t>
+            </a:r>
+          </a:p>
+          <a:p>
+            <a:r>
+              <a:rPr lang="en-US" sz="1800" i="0" dirty="0">
+                <a:solidFill>
+                  <a:srgbClr val="000000"/>
+                </a:solidFill>
+                <a:effectLst/>
+              </a:rPr>
               <a:t>T</a:t>
             </a:r>
             <a:r>
-              <a:rPr lang="en-US" sz="2200" dirty="0">
+              <a:rPr lang="en-US" sz="1800" dirty="0">
                 <a:solidFill>
                   <a:srgbClr val="000000"/>
                 </a:solidFill>
@@ -5422,7 +5722,7 @@
               <a:t>o recommend beer we will perform operation based on the </a:t>
             </a:r>
             <a:r>
-              <a:rPr lang="en-US" sz="2200" dirty="0" err="1">
+              <a:rPr lang="en-US" sz="1800" dirty="0" err="1">
                 <a:solidFill>
                   <a:srgbClr val="000000"/>
                 </a:solidFill>
@@ -5430,108 +5730,41 @@
               <a:t>beer_name</a:t>
             </a:r>
             <a:r>
-              <a:rPr lang="en-US" sz="2200" dirty="0">
+              <a:rPr lang="en-US" sz="1800" dirty="0">
                 <a:solidFill>
                   <a:srgbClr val="000000"/>
                 </a:solidFill>
               </a:rPr>
-              <a:t> we group the dataset by it, next we calculate mean across the all reviews in dataset and arrange it in descending order to get maximum reviews data.</a:t>
-            </a:r>
-          </a:p>
-          <a:p>
-            <a:pPr>
-              <a:buFont typeface="Wingdings" panose="05000000000000000000" pitchFamily="2" charset="2"/>
-              <a:buChar char="Ø"/>
+              <a:t> we group the dataset by it</a:t>
+            </a:r>
+          </a:p>
+          <a:p>
+            <a:r>
+              <a:rPr lang="en-US" sz="1800" dirty="0">
+                <a:solidFill>
+                  <a:srgbClr val="000000"/>
+                </a:solidFill>
+              </a:rPr>
+              <a:t>Next, we calculate mean across the all reviews in dataset and arrange it in descending order to get maximum reviews data</a:t>
+            </a:r>
+          </a:p>
+          <a:p>
+            <a:pPr marL="800100" lvl="1" indent="-342900">
+              <a:buFont typeface="+mj-lt"/>
+              <a:buAutoNum type="arabicPeriod"/>
             </a:pPr>
-            <a:r>
-              <a:rPr lang="en-US" sz="2000" i="0" dirty="0">
-                <a:solidFill>
-                  <a:srgbClr val="000000"/>
-                </a:solidFill>
-                <a:effectLst/>
-              </a:rPr>
-              <a:t>These are top 3 recommendations are:-</a:t>
-            </a:r>
-          </a:p>
-          <a:p>
-            <a:pPr lvl="1"/>
-            <a:r>
-              <a:rPr lang="en-US" sz="1600" b="1" i="0" dirty="0">
-                <a:solidFill>
-                  <a:srgbClr val="000000"/>
-                </a:solidFill>
-                <a:effectLst/>
-              </a:rPr>
-              <a:t> </a:t>
-            </a:r>
-            <a:r>
-              <a:rPr lang="en-US" sz="1600" i="0" dirty="0" err="1">
-                <a:solidFill>
-                  <a:srgbClr val="000000"/>
-                </a:solidFill>
-                <a:effectLst/>
-              </a:rPr>
-              <a:t>Edsten</a:t>
-            </a:r>
-            <a:r>
-              <a:rPr lang="en-US" sz="1600" i="0" dirty="0">
-                <a:solidFill>
-                  <a:srgbClr val="000000"/>
-                </a:solidFill>
-                <a:effectLst/>
-              </a:rPr>
-              <a:t> Triple-Wit	</a:t>
-            </a:r>
-          </a:p>
-          <a:p>
-            <a:pPr lvl="1"/>
-            <a:r>
-              <a:rPr lang="en-US" sz="1600" dirty="0">
-                <a:solidFill>
-                  <a:srgbClr val="000000"/>
-                </a:solidFill>
-              </a:rPr>
-              <a:t> </a:t>
-            </a:r>
-            <a:r>
-              <a:rPr lang="en-US" sz="1600" i="0" dirty="0">
-                <a:solidFill>
-                  <a:srgbClr val="000000"/>
-                </a:solidFill>
-                <a:effectLst/>
-              </a:rPr>
-              <a:t>Old Gander Barley Wine </a:t>
-            </a:r>
-          </a:p>
-          <a:p>
-            <a:pPr lvl="1"/>
-            <a:r>
-              <a:rPr lang="en-US" sz="1600" dirty="0">
-                <a:solidFill>
-                  <a:srgbClr val="000000"/>
-                </a:solidFill>
-              </a:rPr>
-              <a:t> </a:t>
-            </a:r>
-            <a:r>
-              <a:rPr lang="en-US" sz="1600" i="0" dirty="0">
-                <a:solidFill>
-                  <a:srgbClr val="000000"/>
-                </a:solidFill>
-                <a:effectLst/>
-              </a:rPr>
-              <a:t>Rogue Black Brutal</a:t>
-            </a:r>
-          </a:p>
-          <a:p>
-            <a:endParaRPr lang="en-IN" dirty="0"/>
+            <a:endParaRPr lang="en-US" sz="1600" dirty="0">
+              <a:solidFill>
+                <a:srgbClr val="000000"/>
+              </a:solidFill>
+            </a:endParaRPr>
           </a:p>
         </p:txBody>
       </p:sp>
     </p:spTree>
     <p:extLst>
       <p:ext uri="{BB962C8B-B14F-4D97-AF65-F5344CB8AC3E}">
-        <p14:creationId xmlns:p14="http://schemas.microsoft.com/office/powerpoint/2010/main" val="2833084804"/>
+        <p14:creationId xmlns:p14="http://schemas.microsoft.com/office/powerpoint/2010/main" val="3054209540"/>
       </p:ext>
     </p:extLst>
   </p:cSld>
@@ -5560,10 +5793,46 @@
       </p:grpSpPr>
       <p:sp>
         <p:nvSpPr>
+          <p:cNvPr id="2" name="Title 1">
+            <a:extLst>
+              <a:ext uri="{FF2B5EF4-FFF2-40B4-BE49-F238E27FC236}">
+                <a16:creationId xmlns:a16="http://schemas.microsoft.com/office/drawing/2014/main" id="{C9E6F332-56DF-42E4-B1BC-0B0970E54B98}"/>
+              </a:ext>
+            </a:extLst>
+          </p:cNvPr>
+          <p:cNvSpPr>
+            <a:spLocks noGrp="1"/>
+          </p:cNvSpPr>
+          <p:nvPr>
+            <p:ph type="title"/>
+          </p:nvPr>
+        </p:nvSpPr>
+        <p:spPr/>
+        <p:txBody>
+          <a:bodyPr/>
+          <a:lstStyle/>
+          <a:p>
+            <a:r>
+              <a:rPr lang="en-IN" sz="3600" dirty="0"/>
+              <a:t>Business</a:t>
+            </a:r>
+            <a:r>
+              <a:rPr lang="en-IN" dirty="0"/>
+              <a:t> </a:t>
+            </a:r>
+            <a:r>
+              <a:rPr lang="en-IN" sz="3600" dirty="0"/>
+              <a:t>problems continued…</a:t>
+            </a:r>
+          </a:p>
+        </p:txBody>
+      </p:sp>
+      <p:sp>
+        <p:nvSpPr>
           <p:cNvPr id="3" name="Content Placeholder 2">
             <a:extLst>
               <a:ext uri="{FF2B5EF4-FFF2-40B4-BE49-F238E27FC236}">
-                <a16:creationId xmlns:a16="http://schemas.microsoft.com/office/drawing/2014/main" id="{FA3251D2-66BE-4EAE-857C-C86032CC669A}"/>
+                <a16:creationId xmlns:a16="http://schemas.microsoft.com/office/drawing/2014/main" id="{91EDB5C8-BA0E-4029-947E-21352312AC94}"/>
               </a:ext>
             </a:extLst>
           </p:cNvPr>
@@ -5574,15 +5843,10 @@
             <p:ph idx="1"/>
           </p:nvPr>
         </p:nvSpPr>
-        <p:spPr>
-          <a:xfrm>
-            <a:off x="758301" y="213064"/>
-            <a:ext cx="10515600" cy="6249880"/>
-          </a:xfrm>
-        </p:spPr>
+        <p:spPr/>
         <p:txBody>
           <a:bodyPr>
-            <a:normAutofit fontScale="92500" lnSpcReduction="20000"/>
+            <a:normAutofit/>
           </a:bodyPr>
           <a:lstStyle/>
           <a:p>
@@ -5590,7 +5854,7 @@
               <a:buNone/>
             </a:pPr>
             <a:r>
-              <a:rPr lang="en-US" sz="2200" dirty="0">
+              <a:rPr lang="en-US" sz="2000" dirty="0">
                 <a:solidFill>
                   <a:srgbClr val="000000"/>
                 </a:solidFill>
@@ -5598,7 +5862,7 @@
               <a:t>5</a:t>
             </a:r>
             <a:r>
-              <a:rPr lang="en-US" sz="2200" i="0" dirty="0">
+              <a:rPr lang="en-US" sz="2000" i="0" dirty="0">
                 <a:solidFill>
                   <a:srgbClr val="000000"/>
                 </a:solidFill>
@@ -5612,27 +5876,85 @@
               <a:buNone/>
             </a:pPr>
             <a:r>
-              <a:rPr lang="en-US" sz="2200" dirty="0">
+              <a:rPr lang="en-US" sz="2000" dirty="0"/>
+              <a:t>Ans.</a:t>
+            </a:r>
+            <a:r>
+              <a:rPr lang="en-US" sz="2000" dirty="0">
+                <a:solidFill>
+                  <a:srgbClr val="333333"/>
+                </a:solidFill>
+              </a:rPr>
+              <a:t> </a:t>
+            </a:r>
+            <a:r>
+              <a:rPr lang="en-US" sz="2000" b="1" dirty="0">
                 <a:solidFill>
                   <a:srgbClr val="000000"/>
                 </a:solidFill>
               </a:rPr>
-              <a:t>Logic:-</a:t>
-            </a:r>
-          </a:p>
-          <a:p>
-            <a:r>
-              <a:rPr lang="en-US" sz="1900" dirty="0">
+              <a:t>The top favorite beer style are:</a:t>
+            </a:r>
+          </a:p>
+          <a:p>
+            <a:pPr lvl="1"/>
+            <a:r>
+              <a:rPr lang="en-US" sz="1600" dirty="0">
                 <a:solidFill>
                   <a:srgbClr val="000000"/>
                 </a:solidFill>
               </a:rPr>
+              <a:t>American IPA</a:t>
+            </a:r>
+          </a:p>
+          <a:p>
+            <a:pPr lvl="1"/>
+            <a:r>
+              <a:rPr lang="en-US" sz="1600" dirty="0">
+                <a:solidFill>
+                  <a:srgbClr val="000000"/>
+                </a:solidFill>
+              </a:rPr>
+              <a:t>American Double / Imperial IPA</a:t>
+            </a:r>
+          </a:p>
+          <a:p>
+            <a:pPr lvl="1"/>
+            <a:r>
+              <a:rPr lang="en-US" sz="1600" dirty="0">
+                <a:solidFill>
+                  <a:srgbClr val="000000"/>
+                </a:solidFill>
+              </a:rPr>
+              <a:t>American Double / Imperial Stout</a:t>
+            </a:r>
+          </a:p>
+          <a:p>
+            <a:pPr marL="0" indent="0">
+              <a:buNone/>
+            </a:pPr>
+            <a:r>
+              <a:rPr lang="en-US" sz="2000" dirty="0">
+                <a:solidFill>
+                  <a:srgbClr val="000000"/>
+                </a:solidFill>
+              </a:rPr>
+              <a:t>Logic:</a:t>
+            </a:r>
+          </a:p>
+          <a:p>
+            <a:r>
+              <a:rPr lang="en-US" sz="1800" dirty="0">
+                <a:solidFill>
+                  <a:srgbClr val="000000"/>
+                </a:solidFill>
+              </a:rPr>
               <a:t>Based on review written we must identify which review text is positive review or negative review and find out which beer style favorite</a:t>
             </a:r>
           </a:p>
           <a:p>
             <a:r>
-              <a:rPr lang="en-US" sz="1900" dirty="0">
+              <a:rPr lang="en-US" sz="1800" dirty="0">
                 <a:solidFill>
                   <a:srgbClr val="000000"/>
                 </a:solidFill>
@@ -5640,7 +5962,7 @@
               <a:t> There is one </a:t>
             </a:r>
             <a:r>
-              <a:rPr lang="en-US" sz="1900" dirty="0" err="1">
+              <a:rPr lang="en-US" sz="1800" dirty="0" err="1">
                 <a:solidFill>
                   <a:srgbClr val="000000"/>
                 </a:solidFill>
@@ -5648,7 +5970,7 @@
               <a:t>nltk</a:t>
             </a:r>
             <a:r>
-              <a:rPr lang="en-US" sz="1900" dirty="0">
+              <a:rPr lang="en-US" sz="1800" dirty="0">
                 <a:solidFill>
                   <a:srgbClr val="000000"/>
                 </a:solidFill>
@@ -5658,7 +5980,7 @@
           </a:p>
           <a:p>
             <a:r>
-              <a:rPr lang="en-US" sz="1900" dirty="0">
+              <a:rPr lang="en-US" sz="1800" dirty="0">
                 <a:solidFill>
                   <a:srgbClr val="000000"/>
                 </a:solidFill>
@@ -5668,157 +5990,27 @@
           </a:p>
           <a:p>
             <a:r>
-              <a:rPr lang="en-US" sz="1900" dirty="0">
+              <a:rPr lang="en-US" sz="1800" dirty="0">
                 <a:solidFill>
                   <a:srgbClr val="000000"/>
                 </a:solidFill>
               </a:rPr>
-              <a:t>VADER sentiment analysis relies on a dictionary which maps lexical features to emotion intensities called sentiment scores.</a:t>
-            </a:r>
-          </a:p>
-          <a:p>
-            <a:r>
-              <a:rPr lang="en-US" sz="1900" dirty="0">
-                <a:solidFill>
-                  <a:srgbClr val="000000"/>
-                </a:solidFill>
-              </a:rPr>
-              <a:t>The sentiment score of text can be obtained by summing up the intensity of each word in the text.</a:t>
-            </a:r>
-          </a:p>
-          <a:p>
-            <a:r>
-              <a:rPr lang="en-US" sz="1900" dirty="0">
-                <a:solidFill>
-                  <a:srgbClr val="000000"/>
-                </a:solidFill>
-              </a:rPr>
-              <a:t>VADER is intelligent enough to understand basic context of these words, such as “did not love” as a negative sentiments.</a:t>
-            </a:r>
-          </a:p>
-          <a:p>
-            <a:r>
-              <a:rPr lang="en-US" sz="1900" dirty="0">
-                <a:solidFill>
-                  <a:srgbClr val="000000"/>
-                </a:solidFill>
-              </a:rPr>
-              <a:t>The output will return in </a:t>
-            </a:r>
-            <a:r>
-              <a:rPr lang="en-US" sz="1900" dirty="0" err="1">
-                <a:solidFill>
-                  <a:srgbClr val="000000"/>
-                </a:solidFill>
-              </a:rPr>
-              <a:t>positive,negative,neutral</a:t>
-            </a:r>
-            <a:r>
-              <a:rPr lang="en-US" sz="1900" dirty="0">
-                <a:solidFill>
-                  <a:srgbClr val="000000"/>
-                </a:solidFill>
-              </a:rPr>
-              <a:t> and compound value for text data where compound value is the average of sentiments the higher the value the more positive the text</a:t>
-            </a:r>
-          </a:p>
-          <a:p>
-            <a:r>
-              <a:rPr lang="en-US" sz="1900" dirty="0">
-                <a:solidFill>
-                  <a:srgbClr val="000000"/>
-                </a:solidFill>
-              </a:rPr>
-              <a:t>We found out that we have more than 80% positive text</a:t>
-            </a:r>
-          </a:p>
-          <a:p>
-            <a:r>
-              <a:rPr lang="en-US" sz="1900" dirty="0">
-                <a:solidFill>
-                  <a:srgbClr val="000000"/>
-                </a:solidFill>
-              </a:rPr>
-              <a:t>So favorite beer style can be found out which contains high positive text data after analyzing we found out the top favorite beer style </a:t>
-            </a:r>
-          </a:p>
-          <a:p>
-            <a:pPr>
-              <a:buFont typeface="Wingdings" panose="05000000000000000000" pitchFamily="2" charset="2"/>
-              <a:buChar char="Ø"/>
-            </a:pPr>
-            <a:r>
-              <a:rPr lang="en-US" sz="1900" dirty="0">
-                <a:solidFill>
-                  <a:srgbClr val="000000"/>
-                </a:solidFill>
-              </a:rPr>
-              <a:t>The top favorite beer style are:-</a:t>
-            </a:r>
-          </a:p>
-          <a:p>
-            <a:pPr lvl="1"/>
-            <a:r>
-              <a:rPr lang="en-US" sz="1900" dirty="0">
-                <a:solidFill>
-                  <a:srgbClr val="000000"/>
-                </a:solidFill>
-              </a:rPr>
-              <a:t>American IPA</a:t>
-            </a:r>
-          </a:p>
-          <a:p>
-            <a:pPr lvl="1"/>
-            <a:r>
-              <a:rPr lang="en-US" sz="1900" dirty="0">
-                <a:solidFill>
-                  <a:srgbClr val="000000"/>
-                </a:solidFill>
-              </a:rPr>
-              <a:t>American Double / Imperial IPA</a:t>
-            </a:r>
-          </a:p>
-          <a:p>
-            <a:pPr lvl="1"/>
-            <a:r>
-              <a:rPr lang="en-US" sz="1900" dirty="0">
-                <a:solidFill>
-                  <a:srgbClr val="000000"/>
-                </a:solidFill>
-              </a:rPr>
-              <a:t>American Double / Imperial Stout</a:t>
-            </a:r>
-          </a:p>
-          <a:p>
-            <a:endParaRPr lang="en-US" sz="2000" dirty="0">
+              <a:t>VADER sentiment analysis relies on a dictionary which maps lexical features to emotion intensities called sentiment scores</a:t>
+            </a:r>
+          </a:p>
+          <a:p>
+            <a:endParaRPr lang="en-US" sz="1800" dirty="0">
               <a:solidFill>
                 <a:srgbClr val="000000"/>
               </a:solidFill>
             </a:endParaRPr>
           </a:p>
-          <a:p>
-            <a:endParaRPr lang="en-US" sz="2000" dirty="0">
-              <a:solidFill>
-                <a:srgbClr val="000000"/>
-              </a:solidFill>
-            </a:endParaRPr>
-          </a:p>
-          <a:p>
-            <a:pPr marL="0" indent="0">
-              <a:buNone/>
-            </a:pPr>
-            <a:endParaRPr lang="en-US" sz="2200" dirty="0">
-              <a:solidFill>
-                <a:srgbClr val="000000"/>
-              </a:solidFill>
-            </a:endParaRPr>
-          </a:p>
         </p:txBody>
       </p:sp>
     </p:spTree>
     <p:extLst>
       <p:ext uri="{BB962C8B-B14F-4D97-AF65-F5344CB8AC3E}">
-        <p14:creationId xmlns:p14="http://schemas.microsoft.com/office/powerpoint/2010/main" val="1924311656"/>
+        <p14:creationId xmlns:p14="http://schemas.microsoft.com/office/powerpoint/2010/main" val="4276202995"/>
       </p:ext>
     </p:extLst>
   </p:cSld>
@@ -5847,10 +6039,40 @@
       </p:grpSpPr>
       <p:sp>
         <p:nvSpPr>
+          <p:cNvPr id="2" name="Title 1">
+            <a:extLst>
+              <a:ext uri="{FF2B5EF4-FFF2-40B4-BE49-F238E27FC236}">
+                <a16:creationId xmlns:a16="http://schemas.microsoft.com/office/drawing/2014/main" id="{FEAEA31B-0147-4446-A2CD-12EBF43E03E8}"/>
+              </a:ext>
+            </a:extLst>
+          </p:cNvPr>
+          <p:cNvSpPr>
+            <a:spLocks noGrp="1"/>
+          </p:cNvSpPr>
+          <p:nvPr>
+            <p:ph type="title"/>
+          </p:nvPr>
+        </p:nvSpPr>
+        <p:spPr/>
+        <p:txBody>
+          <a:bodyPr>
+            <a:normAutofit/>
+          </a:bodyPr>
+          <a:lstStyle/>
+          <a:p>
+            <a:r>
+              <a:rPr lang="en-IN" sz="3600" dirty="0"/>
+              <a:t>Business problems continued…</a:t>
+            </a:r>
+          </a:p>
+        </p:txBody>
+      </p:sp>
+      <p:sp>
+        <p:nvSpPr>
           <p:cNvPr id="3" name="Content Placeholder 2">
             <a:extLst>
               <a:ext uri="{FF2B5EF4-FFF2-40B4-BE49-F238E27FC236}">
-                <a16:creationId xmlns:a16="http://schemas.microsoft.com/office/drawing/2014/main" id="{32E40385-D5C0-4515-A4A9-52FFE078244C}"/>
+                <a16:creationId xmlns:a16="http://schemas.microsoft.com/office/drawing/2014/main" id="{EAF7753C-86B5-4B72-A2C0-05348BBC5EDC}"/>
               </a:ext>
             </a:extLst>
           </p:cNvPr>
@@ -5861,91 +6083,94 @@
             <p:ph idx="1"/>
           </p:nvPr>
         </p:nvSpPr>
-        <p:spPr>
-          <a:xfrm>
-            <a:off x="580748" y="866836"/>
-            <a:ext cx="10515600" cy="4351338"/>
-          </a:xfrm>
-        </p:spPr>
-        <p:txBody>
-          <a:bodyPr/>
-          <a:lstStyle/>
-          <a:p>
-            <a:pPr marL="0" indent="0">
-              <a:buNone/>
-            </a:pPr>
-            <a:r>
-              <a:rPr lang="en-US" sz="2200" i="0" dirty="0">
+        <p:spPr/>
+        <p:txBody>
+          <a:bodyPr>
+            <a:normAutofit/>
+          </a:bodyPr>
+          <a:lstStyle/>
+          <a:p>
+            <a:r>
+              <a:rPr lang="en-US" sz="1800" dirty="0">
                 <a:solidFill>
                   <a:srgbClr val="000000"/>
                 </a:solidFill>
-                <a:effectLst/>
-              </a:rPr>
-              <a:t>6. How does written review compare to overall review score for the beer styles?</a:t>
-            </a:r>
-          </a:p>
-          <a:p>
-            <a:pPr marL="0" indent="0">
-              <a:buNone/>
-            </a:pPr>
-            <a:r>
-              <a:rPr lang="en-US" sz="2200" dirty="0">
+              </a:rPr>
+              <a:t>The sentiment score of text can be obtained by summing up the intensity of each word in the text</a:t>
+            </a:r>
+          </a:p>
+          <a:p>
+            <a:r>
+              <a:rPr lang="en-US" sz="1800" dirty="0">
                 <a:solidFill>
                   <a:srgbClr val="000000"/>
                 </a:solidFill>
               </a:rPr>
-              <a:t>Logic:-</a:t>
-            </a:r>
-          </a:p>
-          <a:p>
-            <a:r>
-              <a:rPr lang="en-US" sz="2200" i="0" dirty="0">
+              <a:t>VADER is intelligent enough to understand basic context of these words, such as “did not love” as a negative sentiments</a:t>
+            </a:r>
+          </a:p>
+          <a:p>
+            <a:r>
+              <a:rPr lang="en-US" sz="1800" dirty="0">
                 <a:solidFill>
                   <a:srgbClr val="000000"/>
                 </a:solidFill>
-                <a:effectLst/>
-              </a:rPr>
-              <a:t>Here we </a:t>
-            </a:r>
-            <a:r>
-              <a:rPr lang="en-US" sz="2200" dirty="0">
+              </a:rPr>
+              <a:t>The output will return in </a:t>
+            </a:r>
+            <a:r>
+              <a:rPr lang="en-US" sz="1800" dirty="0" err="1">
                 <a:solidFill>
                   <a:srgbClr val="000000"/>
                 </a:solidFill>
               </a:rPr>
-              <a:t>will compare overall review feature with written review for beer style</a:t>
-            </a:r>
-          </a:p>
-          <a:p>
-            <a:r>
-              <a:rPr lang="en-US" sz="2200" i="0" dirty="0">
+              <a:t>positive,negative,neutral</a:t>
+            </a:r>
+            <a:r>
+              <a:rPr lang="en-US" sz="1800" dirty="0">
                 <a:solidFill>
                   <a:srgbClr val="000000"/>
                 </a:solidFill>
-                <a:effectLst/>
-              </a:rPr>
-              <a:t>So we will visualize the features of overall review and written review after visualize we found out that overall review column mostly like text review column</a:t>
-            </a:r>
-          </a:p>
-          <a:p>
-            <a:r>
-              <a:rPr lang="en-US" sz="2200" dirty="0"/>
-              <a:t>Positive review indicates high overall score where negative review showing low score and neutral show either positive or negative.</a:t>
-            </a:r>
-          </a:p>
-          <a:p>
-            <a:r>
-              <a:rPr lang="en-US" sz="2200" dirty="0"/>
-              <a:t> We conclude both overall review and text-based review are quiet similar reviews for beer styles</a:t>
-            </a:r>
-            <a:endParaRPr lang="en-IN" sz="2200" dirty="0"/>
+              </a:rPr>
+              <a:t> and compound value for text data where compound value is the average of sentiments the higher the value the more positive the text</a:t>
+            </a:r>
+          </a:p>
+          <a:p>
+            <a:r>
+              <a:rPr lang="en-US" sz="1800" dirty="0">
+                <a:solidFill>
+                  <a:srgbClr val="000000"/>
+                </a:solidFill>
+              </a:rPr>
+              <a:t>We found out that we have more than 80% positive text</a:t>
+            </a:r>
+          </a:p>
+          <a:p>
+            <a:r>
+              <a:rPr lang="en-US" sz="1800" dirty="0">
+                <a:solidFill>
+                  <a:srgbClr val="000000"/>
+                </a:solidFill>
+              </a:rPr>
+              <a:t>So favorite beer style can be found out which contains high positive text data</a:t>
+            </a:r>
+          </a:p>
+          <a:p>
+            <a:endParaRPr lang="en-US" sz="2800" dirty="0">
+              <a:solidFill>
+                <a:srgbClr val="000000"/>
+              </a:solidFill>
+            </a:endParaRPr>
+          </a:p>
+          <a:p>
+            <a:endParaRPr lang="en-IN" dirty="0"/>
           </a:p>
         </p:txBody>
       </p:sp>
     </p:spTree>
     <p:extLst>
       <p:ext uri="{BB962C8B-B14F-4D97-AF65-F5344CB8AC3E}">
-        <p14:creationId xmlns:p14="http://schemas.microsoft.com/office/powerpoint/2010/main" val="4214146986"/>
+        <p14:creationId xmlns:p14="http://schemas.microsoft.com/office/powerpoint/2010/main" val="668792881"/>
       </p:ext>
     </p:extLst>
   </p:cSld>

</xml_diff>